<commit_message>
added carouse to SDM website
</commit_message>
<xml_diff>
--- a/logos/20150116-logo.pptx
+++ b/logos/20150116-logo.pptx
@@ -206,7 +206,7 @@
           <a:p>
             <a:fld id="{55397277-360A-454E-9892-8B140B67D61E}" type="datetimeFigureOut">
               <a:rPr kumimoji="1" lang="ja-JP" altLang="en-US" smtClean="0"/>
-              <a:t>1/22/15</a:t>
+              <a:t>1/23/15</a:t>
             </a:fld>
             <a:endParaRPr kumimoji="1" lang="ja-JP" altLang="en-US"/>
           </a:p>
@@ -372,7 +372,7 @@
           <a:p>
             <a:fld id="{4A7A5A0B-5B1E-E646-883E-67C7714E0911}" type="datetimeFigureOut">
               <a:rPr kumimoji="1" lang="ja-JP" altLang="en-US" smtClean="0"/>
-              <a:t>1/22/15</a:t>
+              <a:t>1/23/15</a:t>
             </a:fld>
             <a:endParaRPr kumimoji="1" lang="ja-JP" altLang="en-US"/>
           </a:p>
@@ -6830,6 +6830,56 @@
               <a:latin typeface="Impact"/>
               <a:cs typeface="Impact"/>
             </a:endParaRPr>
+          </a:p>
+        </p:txBody>
+      </p:sp>
+      <p:sp>
+        <p:nvSpPr>
+          <p:cNvPr id="12" name="円/楕円 11"/>
+          <p:cNvSpPr/>
+          <p:nvPr/>
+        </p:nvSpPr>
+        <p:spPr>
+          <a:xfrm>
+            <a:off x="4153074" y="1164437"/>
+            <a:ext cx="522507" cy="522507"/>
+          </a:xfrm>
+          <a:prstGeom prst="ellipse">
+            <a:avLst/>
+          </a:prstGeom>
+          <a:solidFill>
+            <a:srgbClr val="FB0006"/>
+          </a:solidFill>
+          <a:ln>
+            <a:noFill/>
+          </a:ln>
+          <a:effectLst/>
+        </p:spPr>
+        <p:style>
+          <a:lnRef idx="1">
+            <a:schemeClr val="accent1"/>
+          </a:lnRef>
+          <a:fillRef idx="3">
+            <a:schemeClr val="accent1"/>
+          </a:fillRef>
+          <a:effectRef idx="2">
+            <a:schemeClr val="accent1"/>
+          </a:effectRef>
+          <a:fontRef idx="minor">
+            <a:schemeClr val="lt1"/>
+          </a:fontRef>
+        </p:style>
+        <p:txBody>
+          <a:bodyPr rot="0" spcFirstLastPara="0" vertOverflow="overflow" horzOverflow="overflow" vert="horz" wrap="square" lIns="91440" tIns="45720" rIns="91440" bIns="45720" numCol="1" spcCol="0" rtlCol="0" fromWordArt="0" anchor="ctr" anchorCtr="0" forceAA="0" compatLnSpc="1">
+            <a:prstTxWarp prst="textNoShape">
+              <a:avLst/>
+            </a:prstTxWarp>
+            <a:noAutofit/>
+          </a:bodyPr>
+          <a:lstStyle/>
+          <a:p>
+            <a:pPr algn="ctr"/>
+            <a:endParaRPr kumimoji="1" lang="ja-JP" altLang="en-US"/>
           </a:p>
         </p:txBody>
       </p:sp>

</xml_diff>